<commit_message>
update the demo of w1
</commit_message>
<xml_diff>
--- a/week-01/day-5/w1pr.pptx
+++ b/week-01/day-5/w1pr.pptx
@@ -295,6 +295,7 @@
           <a:p>
             <a:fld id="{460F9662-45DB-4F6A-AF5D-1780AE16667B}" type="datetimeFigureOut">
               <a:rPr lang="hu-HU" smtClean="0"/>
+              <a:pPr/>
               <a:t>2017.10.06.</a:t>
             </a:fld>
             <a:endParaRPr lang="hu-HU"/>
@@ -337,6 +338,7 @@
           <a:p>
             <a:fld id="{38ADC945-E6F3-4F56-9C7F-BC1AA74EF01A}" type="slidenum">
               <a:rPr lang="hu-HU" smtClean="0"/>
+              <a:pPr/>
               <a:t>‹#›</a:t>
             </a:fld>
             <a:endParaRPr lang="hu-HU"/>
@@ -460,6 +462,7 @@
           <a:p>
             <a:fld id="{460F9662-45DB-4F6A-AF5D-1780AE16667B}" type="datetimeFigureOut">
               <a:rPr lang="hu-HU" smtClean="0"/>
+              <a:pPr/>
               <a:t>2017.10.06.</a:t>
             </a:fld>
             <a:endParaRPr lang="hu-HU"/>
@@ -502,6 +505,7 @@
           <a:p>
             <a:fld id="{38ADC945-E6F3-4F56-9C7F-BC1AA74EF01A}" type="slidenum">
               <a:rPr lang="hu-HU" smtClean="0"/>
+              <a:pPr/>
               <a:t>‹#›</a:t>
             </a:fld>
             <a:endParaRPr lang="hu-HU"/>
@@ -635,6 +639,7 @@
           <a:p>
             <a:fld id="{460F9662-45DB-4F6A-AF5D-1780AE16667B}" type="datetimeFigureOut">
               <a:rPr lang="hu-HU" smtClean="0"/>
+              <a:pPr/>
               <a:t>2017.10.06.</a:t>
             </a:fld>
             <a:endParaRPr lang="hu-HU"/>
@@ -677,6 +682,7 @@
           <a:p>
             <a:fld id="{38ADC945-E6F3-4F56-9C7F-BC1AA74EF01A}" type="slidenum">
               <a:rPr lang="hu-HU" smtClean="0"/>
+              <a:pPr/>
               <a:t>‹#›</a:t>
             </a:fld>
             <a:endParaRPr lang="hu-HU"/>
@@ -800,6 +806,7 @@
           <a:p>
             <a:fld id="{460F9662-45DB-4F6A-AF5D-1780AE16667B}" type="datetimeFigureOut">
               <a:rPr lang="hu-HU" smtClean="0"/>
+              <a:pPr/>
               <a:t>2017.10.06.</a:t>
             </a:fld>
             <a:endParaRPr lang="hu-HU"/>
@@ -842,6 +849,7 @@
           <a:p>
             <a:fld id="{38ADC945-E6F3-4F56-9C7F-BC1AA74EF01A}" type="slidenum">
               <a:rPr lang="hu-HU" smtClean="0"/>
+              <a:pPr/>
               <a:t>‹#›</a:t>
             </a:fld>
             <a:endParaRPr lang="hu-HU"/>
@@ -1041,6 +1049,7 @@
           <a:p>
             <a:fld id="{460F9662-45DB-4F6A-AF5D-1780AE16667B}" type="datetimeFigureOut">
               <a:rPr lang="hu-HU" smtClean="0"/>
+              <a:pPr/>
               <a:t>2017.10.06.</a:t>
             </a:fld>
             <a:endParaRPr lang="hu-HU"/>
@@ -1083,6 +1092,7 @@
           <a:p>
             <a:fld id="{38ADC945-E6F3-4F56-9C7F-BC1AA74EF01A}" type="slidenum">
               <a:rPr lang="hu-HU" smtClean="0"/>
+              <a:pPr/>
               <a:t>‹#›</a:t>
             </a:fld>
             <a:endParaRPr lang="hu-HU"/>
@@ -1324,6 +1334,7 @@
           <a:p>
             <a:fld id="{460F9662-45DB-4F6A-AF5D-1780AE16667B}" type="datetimeFigureOut">
               <a:rPr lang="hu-HU" smtClean="0"/>
+              <a:pPr/>
               <a:t>2017.10.06.</a:t>
             </a:fld>
             <a:endParaRPr lang="hu-HU"/>
@@ -1366,6 +1377,7 @@
           <a:p>
             <a:fld id="{38ADC945-E6F3-4F56-9C7F-BC1AA74EF01A}" type="slidenum">
               <a:rPr lang="hu-HU" smtClean="0"/>
+              <a:pPr/>
               <a:t>‹#›</a:t>
             </a:fld>
             <a:endParaRPr lang="hu-HU"/>
@@ -1741,6 +1753,7 @@
           <a:p>
             <a:fld id="{460F9662-45DB-4F6A-AF5D-1780AE16667B}" type="datetimeFigureOut">
               <a:rPr lang="hu-HU" smtClean="0"/>
+              <a:pPr/>
               <a:t>2017.10.06.</a:t>
             </a:fld>
             <a:endParaRPr lang="hu-HU"/>
@@ -1783,6 +1796,7 @@
           <a:p>
             <a:fld id="{38ADC945-E6F3-4F56-9C7F-BC1AA74EF01A}" type="slidenum">
               <a:rPr lang="hu-HU" smtClean="0"/>
+              <a:pPr/>
               <a:t>‹#›</a:t>
             </a:fld>
             <a:endParaRPr lang="hu-HU"/>
@@ -1854,6 +1868,7 @@
           <a:p>
             <a:fld id="{460F9662-45DB-4F6A-AF5D-1780AE16667B}" type="datetimeFigureOut">
               <a:rPr lang="hu-HU" smtClean="0"/>
+              <a:pPr/>
               <a:t>2017.10.06.</a:t>
             </a:fld>
             <a:endParaRPr lang="hu-HU"/>
@@ -1896,6 +1911,7 @@
           <a:p>
             <a:fld id="{38ADC945-E6F3-4F56-9C7F-BC1AA74EF01A}" type="slidenum">
               <a:rPr lang="hu-HU" smtClean="0"/>
+              <a:pPr/>
               <a:t>‹#›</a:t>
             </a:fld>
             <a:endParaRPr lang="hu-HU"/>
@@ -1944,6 +1960,7 @@
           <a:p>
             <a:fld id="{460F9662-45DB-4F6A-AF5D-1780AE16667B}" type="datetimeFigureOut">
               <a:rPr lang="hu-HU" smtClean="0"/>
+              <a:pPr/>
               <a:t>2017.10.06.</a:t>
             </a:fld>
             <a:endParaRPr lang="hu-HU"/>
@@ -1986,6 +2003,7 @@
           <a:p>
             <a:fld id="{38ADC945-E6F3-4F56-9C7F-BC1AA74EF01A}" type="slidenum">
               <a:rPr lang="hu-HU" smtClean="0"/>
+              <a:pPr/>
               <a:t>‹#›</a:t>
             </a:fld>
             <a:endParaRPr lang="hu-HU"/>
@@ -2216,6 +2234,7 @@
           <a:p>
             <a:fld id="{460F9662-45DB-4F6A-AF5D-1780AE16667B}" type="datetimeFigureOut">
               <a:rPr lang="hu-HU" smtClean="0"/>
+              <a:pPr/>
               <a:t>2017.10.06.</a:t>
             </a:fld>
             <a:endParaRPr lang="hu-HU"/>
@@ -2258,6 +2277,7 @@
           <a:p>
             <a:fld id="{38ADC945-E6F3-4F56-9C7F-BC1AA74EF01A}" type="slidenum">
               <a:rPr lang="hu-HU" smtClean="0"/>
+              <a:pPr/>
               <a:t>‹#›</a:t>
             </a:fld>
             <a:endParaRPr lang="hu-HU"/>
@@ -2464,6 +2484,7 @@
           <a:p>
             <a:fld id="{460F9662-45DB-4F6A-AF5D-1780AE16667B}" type="datetimeFigureOut">
               <a:rPr lang="hu-HU" smtClean="0"/>
+              <a:pPr/>
               <a:t>2017.10.06.</a:t>
             </a:fld>
             <a:endParaRPr lang="hu-HU"/>
@@ -2506,6 +2527,7 @@
           <a:p>
             <a:fld id="{38ADC945-E6F3-4F56-9C7F-BC1AA74EF01A}" type="slidenum">
               <a:rPr lang="hu-HU" smtClean="0"/>
+              <a:pPr/>
               <a:t>‹#›</a:t>
             </a:fld>
             <a:endParaRPr lang="hu-HU"/>
@@ -2672,6 +2694,7 @@
           <a:p>
             <a:fld id="{460F9662-45DB-4F6A-AF5D-1780AE16667B}" type="datetimeFigureOut">
               <a:rPr lang="hu-HU" smtClean="0"/>
+              <a:pPr/>
               <a:t>2017.10.06.</a:t>
             </a:fld>
             <a:endParaRPr lang="hu-HU"/>
@@ -2750,6 +2773,7 @@
           <a:p>
             <a:fld id="{38ADC945-E6F3-4F56-9C7F-BC1AA74EF01A}" type="slidenum">
               <a:rPr lang="hu-HU" smtClean="0"/>
+              <a:pPr/>
               <a:t>‹#›</a:t>
             </a:fld>
             <a:endParaRPr lang="hu-HU"/>
@@ -3042,36 +3066,6 @@
           <a:chExt cx="0" cy="0"/>
         </a:xfrm>
       </p:grpSpPr>
-      <p:sp>
-        <p:nvSpPr>
-          <p:cNvPr id="20482" name="AutoShape 2" descr="Képtalálat a következőre: „greenfox”"/>
-          <p:cNvSpPr>
-            <a:spLocks noChangeAspect="1" noChangeArrowheads="1"/>
-          </p:cNvSpPr>
-          <p:nvPr/>
-        </p:nvSpPr>
-        <p:spPr bwMode="auto">
-          <a:xfrm>
-            <a:off x="155575" y="-144463"/>
-            <a:ext cx="304800" cy="304801"/>
-          </a:xfrm>
-          <a:prstGeom prst="rect">
-            <a:avLst/>
-          </a:prstGeom>
-          <a:noFill/>
-        </p:spPr>
-        <p:txBody>
-          <a:bodyPr vert="horz" wrap="square" lIns="91440" tIns="45720" rIns="91440" bIns="45720" numCol="1" anchor="t" anchorCtr="0" compatLnSpc="1">
-            <a:prstTxWarp prst="textNoShape">
-              <a:avLst/>
-            </a:prstTxWarp>
-          </a:bodyPr>
-          <a:lstStyle/>
-          <a:p>
-            <a:endParaRPr lang="hu-HU"/>
-          </a:p>
-        </p:txBody>
-      </p:sp>
       <p:pic>
         <p:nvPicPr>
           <p:cNvPr id="20484" name="Picture 4" descr="Képtalálat a következőre: „greenfox”"/>
@@ -3221,66 +3215,6 @@
           <a:chExt cx="0" cy="0"/>
         </a:xfrm>
       </p:grpSpPr>
-      <p:sp>
-        <p:nvSpPr>
-          <p:cNvPr id="20482" name="AutoShape 2" descr="Képtalálat a következőre: „greenfox”"/>
-          <p:cNvSpPr>
-            <a:spLocks noChangeAspect="1" noChangeArrowheads="1"/>
-          </p:cNvSpPr>
-          <p:nvPr/>
-        </p:nvSpPr>
-        <p:spPr bwMode="auto">
-          <a:xfrm>
-            <a:off x="155575" y="-144463"/>
-            <a:ext cx="304800" cy="304801"/>
-          </a:xfrm>
-          <a:prstGeom prst="rect">
-            <a:avLst/>
-          </a:prstGeom>
-          <a:noFill/>
-        </p:spPr>
-        <p:txBody>
-          <a:bodyPr vert="horz" wrap="square" lIns="91440" tIns="45720" rIns="91440" bIns="45720" numCol="1" anchor="t" anchorCtr="0" compatLnSpc="1">
-            <a:prstTxWarp prst="textNoShape">
-              <a:avLst/>
-            </a:prstTxWarp>
-          </a:bodyPr>
-          <a:lstStyle/>
-          <a:p>
-            <a:endParaRPr lang="hu-HU"/>
-          </a:p>
-        </p:txBody>
-      </p:sp>
-      <p:sp>
-        <p:nvSpPr>
-          <p:cNvPr id="21506" name="AutoShape 2" descr="Képtalálat a következőre: „foxhole”"/>
-          <p:cNvSpPr>
-            <a:spLocks noChangeAspect="1" noChangeArrowheads="1"/>
-          </p:cNvSpPr>
-          <p:nvPr/>
-        </p:nvSpPr>
-        <p:spPr bwMode="auto">
-          <a:xfrm>
-            <a:off x="155575" y="-144463"/>
-            <a:ext cx="304800" cy="304801"/>
-          </a:xfrm>
-          <a:prstGeom prst="rect">
-            <a:avLst/>
-          </a:prstGeom>
-          <a:noFill/>
-        </p:spPr>
-        <p:txBody>
-          <a:bodyPr vert="horz" wrap="square" lIns="91440" tIns="45720" rIns="91440" bIns="45720" numCol="1" anchor="t" anchorCtr="0" compatLnSpc="1">
-            <a:prstTxWarp prst="textNoShape">
-              <a:avLst/>
-            </a:prstTxWarp>
-          </a:bodyPr>
-          <a:lstStyle/>
-          <a:p>
-            <a:endParaRPr lang="hu-HU"/>
-          </a:p>
-        </p:txBody>
-      </p:sp>
       <p:pic>
         <p:nvPicPr>
           <p:cNvPr id="21507" name="Picture 3" descr="C:\Documents and Settings\Andris\Asztal\Foxhole.jpg"/>
@@ -3639,66 +3573,6 @@
           </a:ln>
         </p:spPr>
       </p:pic>
-      <p:sp>
-        <p:nvSpPr>
-          <p:cNvPr id="1029" name="AutoShape 5" descr="Képtalálat a következőre: „github monster”"/>
-          <p:cNvSpPr>
-            <a:spLocks noChangeAspect="1" noChangeArrowheads="1"/>
-          </p:cNvSpPr>
-          <p:nvPr/>
-        </p:nvSpPr>
-        <p:spPr bwMode="auto">
-          <a:xfrm>
-            <a:off x="155575" y="-144463"/>
-            <a:ext cx="304800" cy="304801"/>
-          </a:xfrm>
-          <a:prstGeom prst="rect">
-            <a:avLst/>
-          </a:prstGeom>
-          <a:noFill/>
-        </p:spPr>
-        <p:txBody>
-          <a:bodyPr vert="horz" wrap="square" lIns="91440" tIns="45720" rIns="91440" bIns="45720" numCol="1" anchor="t" anchorCtr="0" compatLnSpc="1">
-            <a:prstTxWarp prst="textNoShape">
-              <a:avLst/>
-            </a:prstTxWarp>
-          </a:bodyPr>
-          <a:lstStyle/>
-          <a:p>
-            <a:endParaRPr lang="hu-HU"/>
-          </a:p>
-        </p:txBody>
-      </p:sp>
-      <p:sp>
-        <p:nvSpPr>
-          <p:cNvPr id="1031" name="AutoShape 7" descr="Képtalálat a következőre: „github monster”"/>
-          <p:cNvSpPr>
-            <a:spLocks noChangeAspect="1" noChangeArrowheads="1"/>
-          </p:cNvSpPr>
-          <p:nvPr/>
-        </p:nvSpPr>
-        <p:spPr bwMode="auto">
-          <a:xfrm>
-            <a:off x="155575" y="-144463"/>
-            <a:ext cx="304800" cy="304801"/>
-          </a:xfrm>
-          <a:prstGeom prst="rect">
-            <a:avLst/>
-          </a:prstGeom>
-          <a:noFill/>
-        </p:spPr>
-        <p:txBody>
-          <a:bodyPr vert="horz" wrap="square" lIns="91440" tIns="45720" rIns="91440" bIns="45720" numCol="1" anchor="t" anchorCtr="0" compatLnSpc="1">
-            <a:prstTxWarp prst="textNoShape">
-              <a:avLst/>
-            </a:prstTxWarp>
-          </a:bodyPr>
-          <a:lstStyle/>
-          <a:p>
-            <a:endParaRPr lang="hu-HU"/>
-          </a:p>
-        </p:txBody>
-      </p:sp>
       <p:pic>
         <p:nvPicPr>
           <p:cNvPr id="1032" name="Picture 8" descr="C:\Documents and Settings\Andris\Asztal\letöltés.png"/>
@@ -4460,66 +4334,6 @@
           <a:noFill/>
         </p:spPr>
       </p:pic>
-      <p:sp>
-        <p:nvSpPr>
-          <p:cNvPr id="5124" name="AutoShape 4" descr="Képtalálat a következőre: „odd even”"/>
-          <p:cNvSpPr>
-            <a:spLocks noChangeAspect="1" noChangeArrowheads="1"/>
-          </p:cNvSpPr>
-          <p:nvPr/>
-        </p:nvSpPr>
-        <p:spPr bwMode="auto">
-          <a:xfrm>
-            <a:off x="155575" y="-144463"/>
-            <a:ext cx="304800" cy="304801"/>
-          </a:xfrm>
-          <a:prstGeom prst="rect">
-            <a:avLst/>
-          </a:prstGeom>
-          <a:noFill/>
-        </p:spPr>
-        <p:txBody>
-          <a:bodyPr vert="horz" wrap="square" lIns="91440" tIns="45720" rIns="91440" bIns="45720" numCol="1" anchor="t" anchorCtr="0" compatLnSpc="1">
-            <a:prstTxWarp prst="textNoShape">
-              <a:avLst/>
-            </a:prstTxWarp>
-          </a:bodyPr>
-          <a:lstStyle/>
-          <a:p>
-            <a:endParaRPr lang="hu-HU"/>
-          </a:p>
-        </p:txBody>
-      </p:sp>
-      <p:sp>
-        <p:nvSpPr>
-          <p:cNvPr id="5126" name="AutoShape 6" descr="Képtalálat a következőre: „odd even”"/>
-          <p:cNvSpPr>
-            <a:spLocks noChangeAspect="1" noChangeArrowheads="1"/>
-          </p:cNvSpPr>
-          <p:nvPr/>
-        </p:nvSpPr>
-        <p:spPr bwMode="auto">
-          <a:xfrm>
-            <a:off x="155575" y="-144463"/>
-            <a:ext cx="304800" cy="304801"/>
-          </a:xfrm>
-          <a:prstGeom prst="rect">
-            <a:avLst/>
-          </a:prstGeom>
-          <a:noFill/>
-        </p:spPr>
-        <p:txBody>
-          <a:bodyPr vert="horz" wrap="square" lIns="91440" tIns="45720" rIns="91440" bIns="45720" numCol="1" anchor="t" anchorCtr="0" compatLnSpc="1">
-            <a:prstTxWarp prst="textNoShape">
-              <a:avLst/>
-            </a:prstTxWarp>
-          </a:bodyPr>
-          <a:lstStyle/>
-          <a:p>
-            <a:endParaRPr lang="hu-HU"/>
-          </a:p>
-        </p:txBody>
-      </p:sp>
       <p:pic>
         <p:nvPicPr>
           <p:cNvPr id="5128" name="Picture 8" descr="Képtalálat a következőre: „odd even”"/>
@@ -4572,156 +4386,6 @@
           <a:noFill/>
         </p:spPr>
       </p:pic>
-      <p:sp>
-        <p:nvSpPr>
-          <p:cNvPr id="5134" name="AutoShape 14" descr="Képtalálat a következőre: „commit”"/>
-          <p:cNvSpPr>
-            <a:spLocks noChangeAspect="1" noChangeArrowheads="1"/>
-          </p:cNvSpPr>
-          <p:nvPr/>
-        </p:nvSpPr>
-        <p:spPr bwMode="auto">
-          <a:xfrm>
-            <a:off x="155575" y="-144463"/>
-            <a:ext cx="304800" cy="304801"/>
-          </a:xfrm>
-          <a:prstGeom prst="rect">
-            <a:avLst/>
-          </a:prstGeom>
-          <a:noFill/>
-        </p:spPr>
-        <p:txBody>
-          <a:bodyPr vert="horz" wrap="square" lIns="91440" tIns="45720" rIns="91440" bIns="45720" numCol="1" anchor="t" anchorCtr="0" compatLnSpc="1">
-            <a:prstTxWarp prst="textNoShape">
-              <a:avLst/>
-            </a:prstTxWarp>
-          </a:bodyPr>
-          <a:lstStyle/>
-          <a:p>
-            <a:endParaRPr lang="hu-HU"/>
-          </a:p>
-        </p:txBody>
-      </p:sp>
-      <p:sp>
-        <p:nvSpPr>
-          <p:cNvPr id="5136" name="AutoShape 16" descr="Képtalálat a következőre: „commit”"/>
-          <p:cNvSpPr>
-            <a:spLocks noChangeAspect="1" noChangeArrowheads="1"/>
-          </p:cNvSpPr>
-          <p:nvPr/>
-        </p:nvSpPr>
-        <p:spPr bwMode="auto">
-          <a:xfrm>
-            <a:off x="155575" y="-144463"/>
-            <a:ext cx="304800" cy="304801"/>
-          </a:xfrm>
-          <a:prstGeom prst="rect">
-            <a:avLst/>
-          </a:prstGeom>
-          <a:noFill/>
-        </p:spPr>
-        <p:txBody>
-          <a:bodyPr vert="horz" wrap="square" lIns="91440" tIns="45720" rIns="91440" bIns="45720" numCol="1" anchor="t" anchorCtr="0" compatLnSpc="1">
-            <a:prstTxWarp prst="textNoShape">
-              <a:avLst/>
-            </a:prstTxWarp>
-          </a:bodyPr>
-          <a:lstStyle/>
-          <a:p>
-            <a:endParaRPr lang="hu-HU"/>
-          </a:p>
-        </p:txBody>
-      </p:sp>
-      <p:sp>
-        <p:nvSpPr>
-          <p:cNvPr id="5138" name="AutoShape 18" descr="Képtalálat a következőre: „commit”"/>
-          <p:cNvSpPr>
-            <a:spLocks noChangeAspect="1" noChangeArrowheads="1"/>
-          </p:cNvSpPr>
-          <p:nvPr/>
-        </p:nvSpPr>
-        <p:spPr bwMode="auto">
-          <a:xfrm>
-            <a:off x="155575" y="-144463"/>
-            <a:ext cx="304800" cy="304801"/>
-          </a:xfrm>
-          <a:prstGeom prst="rect">
-            <a:avLst/>
-          </a:prstGeom>
-          <a:noFill/>
-        </p:spPr>
-        <p:txBody>
-          <a:bodyPr vert="horz" wrap="square" lIns="91440" tIns="45720" rIns="91440" bIns="45720" numCol="1" anchor="t" anchorCtr="0" compatLnSpc="1">
-            <a:prstTxWarp prst="textNoShape">
-              <a:avLst/>
-            </a:prstTxWarp>
-          </a:bodyPr>
-          <a:lstStyle/>
-          <a:p>
-            <a:endParaRPr lang="hu-HU"/>
-          </a:p>
-        </p:txBody>
-      </p:sp>
-      <p:sp>
-        <p:nvSpPr>
-          <p:cNvPr id="5141" name="AutoShape 21" descr="Képtalálat a következőre: „Dividend Remainder”"/>
-          <p:cNvSpPr>
-            <a:spLocks noChangeAspect="1" noChangeArrowheads="1"/>
-          </p:cNvSpPr>
-          <p:nvPr/>
-        </p:nvSpPr>
-        <p:spPr bwMode="auto">
-          <a:xfrm>
-            <a:off x="155575" y="-144463"/>
-            <a:ext cx="304800" cy="304801"/>
-          </a:xfrm>
-          <a:prstGeom prst="rect">
-            <a:avLst/>
-          </a:prstGeom>
-          <a:noFill/>
-        </p:spPr>
-        <p:txBody>
-          <a:bodyPr vert="horz" wrap="square" lIns="91440" tIns="45720" rIns="91440" bIns="45720" numCol="1" anchor="t" anchorCtr="0" compatLnSpc="1">
-            <a:prstTxWarp prst="textNoShape">
-              <a:avLst/>
-            </a:prstTxWarp>
-          </a:bodyPr>
-          <a:lstStyle/>
-          <a:p>
-            <a:endParaRPr lang="hu-HU"/>
-          </a:p>
-        </p:txBody>
-      </p:sp>
-      <p:sp>
-        <p:nvSpPr>
-          <p:cNvPr id="5143" name="AutoShape 23" descr="Képtalálat a következőre: „Dividend Remainder”"/>
-          <p:cNvSpPr>
-            <a:spLocks noChangeAspect="1" noChangeArrowheads="1"/>
-          </p:cNvSpPr>
-          <p:nvPr/>
-        </p:nvSpPr>
-        <p:spPr bwMode="auto">
-          <a:xfrm>
-            <a:off x="155575" y="-144463"/>
-            <a:ext cx="304800" cy="304801"/>
-          </a:xfrm>
-          <a:prstGeom prst="rect">
-            <a:avLst/>
-          </a:prstGeom>
-          <a:noFill/>
-        </p:spPr>
-        <p:txBody>
-          <a:bodyPr vert="horz" wrap="square" lIns="91440" tIns="45720" rIns="91440" bIns="45720" numCol="1" anchor="t" anchorCtr="0" compatLnSpc="1">
-            <a:prstTxWarp prst="textNoShape">
-              <a:avLst/>
-            </a:prstTxWarp>
-          </a:bodyPr>
-          <a:lstStyle/>
-          <a:p>
-            <a:endParaRPr lang="hu-HU"/>
-          </a:p>
-        </p:txBody>
-      </p:sp>
       <p:pic>
         <p:nvPicPr>
           <p:cNvPr id="5146" name="Picture 26" descr="Képtalálat a következőre: „Dividend Remainder”"/>
@@ -5302,96 +4966,6 @@
           <a:chExt cx="0" cy="0"/>
         </a:xfrm>
       </p:grpSpPr>
-      <p:sp>
-        <p:nvSpPr>
-          <p:cNvPr id="19458" name="AutoShape 2" descr="Képtalálat a következőre: „code review”"/>
-          <p:cNvSpPr>
-            <a:spLocks noChangeAspect="1" noChangeArrowheads="1"/>
-          </p:cNvSpPr>
-          <p:nvPr/>
-        </p:nvSpPr>
-        <p:spPr bwMode="auto">
-          <a:xfrm>
-            <a:off x="155575" y="-144463"/>
-            <a:ext cx="304800" cy="304801"/>
-          </a:xfrm>
-          <a:prstGeom prst="rect">
-            <a:avLst/>
-          </a:prstGeom>
-          <a:noFill/>
-        </p:spPr>
-        <p:txBody>
-          <a:bodyPr vert="horz" wrap="square" lIns="91440" tIns="45720" rIns="91440" bIns="45720" numCol="1" anchor="t" anchorCtr="0" compatLnSpc="1">
-            <a:prstTxWarp prst="textNoShape">
-              <a:avLst/>
-            </a:prstTxWarp>
-          </a:bodyPr>
-          <a:lstStyle/>
-          <a:p>
-            <a:endParaRPr lang="hu-HU"/>
-          </a:p>
-        </p:txBody>
-      </p:sp>
-      <p:sp>
-        <p:nvSpPr>
-          <p:cNvPr id="19460" name="AutoShape 4" descr="Képtalálat a következőre: „code review”"/>
-          <p:cNvSpPr>
-            <a:spLocks noChangeAspect="1" noChangeArrowheads="1"/>
-          </p:cNvSpPr>
-          <p:nvPr/>
-        </p:nvSpPr>
-        <p:spPr bwMode="auto">
-          <a:xfrm>
-            <a:off x="155575" y="-144463"/>
-            <a:ext cx="304800" cy="304801"/>
-          </a:xfrm>
-          <a:prstGeom prst="rect">
-            <a:avLst/>
-          </a:prstGeom>
-          <a:noFill/>
-        </p:spPr>
-        <p:txBody>
-          <a:bodyPr vert="horz" wrap="square" lIns="91440" tIns="45720" rIns="91440" bIns="45720" numCol="1" anchor="t" anchorCtr="0" compatLnSpc="1">
-            <a:prstTxWarp prst="textNoShape">
-              <a:avLst/>
-            </a:prstTxWarp>
-          </a:bodyPr>
-          <a:lstStyle/>
-          <a:p>
-            <a:endParaRPr lang="hu-HU"/>
-          </a:p>
-        </p:txBody>
-      </p:sp>
-      <p:sp>
-        <p:nvSpPr>
-          <p:cNvPr id="19462" name="AutoShape 6" descr="Képtalálat a következőre: „code review”"/>
-          <p:cNvSpPr>
-            <a:spLocks noChangeAspect="1" noChangeArrowheads="1"/>
-          </p:cNvSpPr>
-          <p:nvPr/>
-        </p:nvSpPr>
-        <p:spPr bwMode="auto">
-          <a:xfrm>
-            <a:off x="155575" y="-144463"/>
-            <a:ext cx="304800" cy="304801"/>
-          </a:xfrm>
-          <a:prstGeom prst="rect">
-            <a:avLst/>
-          </a:prstGeom>
-          <a:noFill/>
-        </p:spPr>
-        <p:txBody>
-          <a:bodyPr vert="horz" wrap="square" lIns="91440" tIns="45720" rIns="91440" bIns="45720" numCol="1" anchor="t" anchorCtr="0" compatLnSpc="1">
-            <a:prstTxWarp prst="textNoShape">
-              <a:avLst/>
-            </a:prstTxWarp>
-          </a:bodyPr>
-          <a:lstStyle/>
-          <a:p>
-            <a:endParaRPr lang="hu-HU"/>
-          </a:p>
-        </p:txBody>
-      </p:sp>
       <p:pic>
         <p:nvPicPr>
           <p:cNvPr id="19463" name="Picture 7" descr="C:\Documents and Settings\Andris\Asztal\r_142619_MFMQH.jpg"/>

</xml_diff>